<commit_message>
9.23.24 pptx content finished
</commit_message>
<xml_diff>
--- a/mp1_powerpoint.pptx
+++ b/mp1_powerpoint.pptx
@@ -28,8 +28,10 @@
     <p:sldId id="267" r:id="rId22"/>
     <p:sldId id="268" r:id="rId23"/>
     <p:sldId id="269" r:id="rId24"/>
-    <p:sldId id="270" r:id="rId25"/>
-    <p:sldId id="271" r:id="rId26"/>
+    <p:sldId id="290" r:id="rId25"/>
+    <p:sldId id="291" r:id="rId26"/>
+    <p:sldId id="270" r:id="rId27"/>
+    <p:sldId id="271" r:id="rId28"/>
   </p:sldIdLst>
   <p:sldSz cx="12192000" cy="6858000"/>
   <p:notesSz cx="6858000" cy="9144000"/>
@@ -283,7 +285,7 @@
           <a:p>
             <a:fld id="{3E188059-9AAA-48DC-89EE-5FBEEAFD7015}" type="datetimeFigureOut">
               <a:rPr lang="en-US" smtClean="0"/>
-              <a:t>9/21/2024</a:t>
+              <a:t>9/23/2024</a:t>
             </a:fld>
             <a:endParaRPr lang="en-US"/>
           </a:p>
@@ -481,7 +483,7 @@
           <a:p>
             <a:fld id="{3E188059-9AAA-48DC-89EE-5FBEEAFD7015}" type="datetimeFigureOut">
               <a:rPr lang="en-US" smtClean="0"/>
-              <a:t>9/21/2024</a:t>
+              <a:t>9/23/2024</a:t>
             </a:fld>
             <a:endParaRPr lang="en-US"/>
           </a:p>
@@ -689,7 +691,7 @@
           <a:p>
             <a:fld id="{3E188059-9AAA-48DC-89EE-5FBEEAFD7015}" type="datetimeFigureOut">
               <a:rPr lang="en-US" smtClean="0"/>
-              <a:t>9/21/2024</a:t>
+              <a:t>9/23/2024</a:t>
             </a:fld>
             <a:endParaRPr lang="en-US"/>
           </a:p>
@@ -887,7 +889,7 @@
           <a:p>
             <a:fld id="{3E188059-9AAA-48DC-89EE-5FBEEAFD7015}" type="datetimeFigureOut">
               <a:rPr lang="en-US" smtClean="0"/>
-              <a:t>9/21/2024</a:t>
+              <a:t>9/23/2024</a:t>
             </a:fld>
             <a:endParaRPr lang="en-US"/>
           </a:p>
@@ -1162,7 +1164,7 @@
           <a:p>
             <a:fld id="{3E188059-9AAA-48DC-89EE-5FBEEAFD7015}" type="datetimeFigureOut">
               <a:rPr lang="en-US" smtClean="0"/>
-              <a:t>9/21/2024</a:t>
+              <a:t>9/23/2024</a:t>
             </a:fld>
             <a:endParaRPr lang="en-US"/>
           </a:p>
@@ -1427,7 +1429,7 @@
           <a:p>
             <a:fld id="{3E188059-9AAA-48DC-89EE-5FBEEAFD7015}" type="datetimeFigureOut">
               <a:rPr lang="en-US" smtClean="0"/>
-              <a:t>9/21/2024</a:t>
+              <a:t>9/23/2024</a:t>
             </a:fld>
             <a:endParaRPr lang="en-US"/>
           </a:p>
@@ -1839,7 +1841,7 @@
           <a:p>
             <a:fld id="{3E188059-9AAA-48DC-89EE-5FBEEAFD7015}" type="datetimeFigureOut">
               <a:rPr lang="en-US" smtClean="0"/>
-              <a:t>9/21/2024</a:t>
+              <a:t>9/23/2024</a:t>
             </a:fld>
             <a:endParaRPr lang="en-US"/>
           </a:p>
@@ -1980,7 +1982,7 @@
           <a:p>
             <a:fld id="{3E188059-9AAA-48DC-89EE-5FBEEAFD7015}" type="datetimeFigureOut">
               <a:rPr lang="en-US" smtClean="0"/>
-              <a:t>9/21/2024</a:t>
+              <a:t>9/23/2024</a:t>
             </a:fld>
             <a:endParaRPr lang="en-US"/>
           </a:p>
@@ -2093,7 +2095,7 @@
           <a:p>
             <a:fld id="{3E188059-9AAA-48DC-89EE-5FBEEAFD7015}" type="datetimeFigureOut">
               <a:rPr lang="en-US" smtClean="0"/>
-              <a:t>9/21/2024</a:t>
+              <a:t>9/23/2024</a:t>
             </a:fld>
             <a:endParaRPr lang="en-US"/>
           </a:p>
@@ -2404,7 +2406,7 @@
           <a:p>
             <a:fld id="{3E188059-9AAA-48DC-89EE-5FBEEAFD7015}" type="datetimeFigureOut">
               <a:rPr lang="en-US" smtClean="0"/>
-              <a:t>9/21/2024</a:t>
+              <a:t>9/23/2024</a:t>
             </a:fld>
             <a:endParaRPr lang="en-US"/>
           </a:p>
@@ -2692,7 +2694,7 @@
           <a:p>
             <a:fld id="{3E188059-9AAA-48DC-89EE-5FBEEAFD7015}" type="datetimeFigureOut">
               <a:rPr lang="en-US" smtClean="0"/>
-              <a:t>9/21/2024</a:t>
+              <a:t>9/23/2024</a:t>
             </a:fld>
             <a:endParaRPr lang="en-US"/>
           </a:p>
@@ -2933,7 +2935,7 @@
           <a:p>
             <a:fld id="{3E188059-9AAA-48DC-89EE-5FBEEAFD7015}" type="datetimeFigureOut">
               <a:rPr lang="en-US" smtClean="0"/>
-              <a:t>9/21/2024</a:t>
+              <a:t>9/23/2024</a:t>
             </a:fld>
             <a:endParaRPr lang="en-US"/>
           </a:p>
@@ -3793,7 +3795,7 @@
         <p:spPr>
           <a:xfrm>
             <a:off x="838200" y="1455385"/>
-            <a:ext cx="10515600" cy="3477875"/>
+            <a:ext cx="10515600" cy="3785652"/>
           </a:xfrm>
           <a:prstGeom prst="rect">
             <a:avLst/>
@@ -3806,27 +3808,27 @@
           </a:bodyPr>
           <a:lstStyle/>
           <a:p>
-            <a:pPr marL="285750" indent="-285750">
+            <a:pPr marL="342900" indent="-342900">
               <a:buFont typeface="Arial" panose="020B0604020202020204" pitchFamily="34" charset="0"/>
               <a:buChar char="•"/>
             </a:pPr>
             <a:r>
               <a:rPr lang="en-US" sz="2000" dirty="0"/>
-              <a:t>throttle: would expect to be negative, as velocity slows</a:t>
-            </a:r>
-          </a:p>
-          <a:p>
-            <a:pPr marL="285750" indent="-285750">
+              <a:t>throttle: would expect to decrease or go to zero</a:t>
+            </a:r>
+          </a:p>
+          <a:p>
+            <a:pPr marL="342900" indent="-342900">
               <a:buFont typeface="Arial" panose="020B0604020202020204" pitchFamily="34" charset="0"/>
               <a:buChar char="•"/>
             </a:pPr>
             <a:r>
               <a:rPr lang="en-US" sz="2000" dirty="0"/>
-              <a:t>velocity: would expect to drop</a:t>
-            </a:r>
-          </a:p>
-          <a:p>
-            <a:pPr marL="285750" indent="-285750">
+              <a:t>velocity: would expect to suddenly drop</a:t>
+            </a:r>
+          </a:p>
+          <a:p>
+            <a:pPr marL="342900" indent="-342900">
               <a:buFont typeface="Arial" panose="020B0604020202020204" pitchFamily="34" charset="0"/>
               <a:buChar char="•"/>
             </a:pPr>
@@ -3836,31 +3838,48 @@
             </a:r>
           </a:p>
           <a:p>
-            <a:pPr marL="285750" indent="-285750">
+            <a:pPr marL="342900" indent="-342900">
               <a:buFont typeface="Arial" panose="020B0604020202020204" pitchFamily="34" charset="0"/>
               <a:buChar char="•"/>
             </a:pPr>
             <a:r>
               <a:rPr lang="en-US" sz="2000" dirty="0"/>
-              <a:t>brake: may or may not change depending on the abruptness of the crash. Would expect a slight change in general</a:t>
-            </a:r>
-          </a:p>
-          <a:p>
-            <a:pPr marL="285750" indent="-285750">
+              <a:t>brake: may or may not change depending on the abruptness of the crash. Most likely sudden brake before impact if noticed</a:t>
+            </a:r>
+          </a:p>
+          <a:p>
+            <a:pPr marL="342900" indent="-342900">
               <a:buFont typeface="Arial" panose="020B0604020202020204" pitchFamily="34" charset="0"/>
               <a:buChar char="•"/>
             </a:pPr>
             <a:r>
               <a:rPr lang="en-US" sz="2000" dirty="0"/>
-              <a:t>x, y, cvip: would be hard to compare against non accident data</a:t>
-            </a:r>
-          </a:p>
-          <a:p>
-            <a:pPr marL="285750" indent="-285750">
+              <a:t>x: correlated to steering, would expect a sudden change when merging to another lane</a:t>
+            </a:r>
+          </a:p>
+          <a:p>
+            <a:pPr marL="342900" indent="-342900">
               <a:buFont typeface="Arial" panose="020B0604020202020204" pitchFamily="34" charset="0"/>
               <a:buChar char="•"/>
             </a:pPr>
-            <a:endParaRPr lang="en-US" sz="2000" dirty="0"/>
+            <a:r>
+              <a:rPr lang="en-US" sz="2000" dirty="0"/>
+              <a:t>y: expect a change in slope when accelerating or braking</a:t>
+            </a:r>
+          </a:p>
+          <a:p>
+            <a:pPr marL="342900" indent="-342900">
+              <a:buFont typeface="Arial" panose="020B0604020202020204" pitchFamily="34" charset="0"/>
+              <a:buChar char="•"/>
+            </a:pPr>
+            <a:r>
+              <a:rPr lang="en-US" sz="2000" dirty="0" err="1"/>
+              <a:t>cvip</a:t>
+            </a:r>
+            <a:r>
+              <a:rPr lang="en-US" sz="2000" dirty="0"/>
+              <a:t>: would expect it to go to zero before the crash</a:t>
+            </a:r>
           </a:p>
           <a:p>
             <a:pPr marL="285750" indent="-285750">
@@ -6331,7 +6350,7 @@
         <p:spPr>
           <a:xfrm>
             <a:off x="513729" y="1095875"/>
-            <a:ext cx="11300900" cy="3970318"/>
+            <a:ext cx="11300900" cy="5632311"/>
           </a:xfrm>
           <a:prstGeom prst="rect">
             <a:avLst/>
@@ -6442,8 +6461,20 @@
                 </a:solidFill>
                 <a:latin typeface="Arial" panose="020B0604020202020204" pitchFamily="34" charset="0"/>
               </a:rPr>
-              <a:t>H0:</a:t>
-            </a:r>
+              <a:t>H0: </a:t>
+            </a:r>
+            <a:r>
+              <a:rPr lang="en-US" dirty="0">
+                <a:solidFill>
+                  <a:srgbClr val="212529"/>
+                </a:solidFill>
+                <a:latin typeface="Arial" panose="020B0604020202020204" pitchFamily="34" charset="0"/>
+              </a:rPr>
+              <a:t>There is no significant difference between the steering variable population means between the normal and abnormal runs. </a:t>
+            </a:r>
+          </a:p>
+          <a:p>
+            <a:pPr lvl="1"/>
             <a:endParaRPr lang="en-US" dirty="0">
               <a:solidFill>
                 <a:srgbClr val="212529"/>
@@ -6460,8 +6491,23 @@
                 </a:solidFill>
                 <a:latin typeface="Arial" panose="020B0604020202020204" pitchFamily="34" charset="0"/>
               </a:rPr>
-              <a:t>H1:</a:t>
-            </a:r>
+              <a:t>H1: </a:t>
+            </a:r>
+            <a:r>
+              <a:rPr lang="en-US" dirty="0">
+                <a:solidFill>
+                  <a:srgbClr val="212529"/>
+                </a:solidFill>
+                <a:latin typeface="Arial" panose="020B0604020202020204" pitchFamily="34" charset="0"/>
+              </a:rPr>
+              <a:t>There is a significant difference between the steering variable population means between the normal and abnormal runs.</a:t>
+            </a:r>
+            <a:endParaRPr lang="en-US" altLang="zh-CN" dirty="0">
+              <a:solidFill>
+                <a:srgbClr val="212529"/>
+              </a:solidFill>
+              <a:latin typeface="Arial" panose="020B0604020202020204" pitchFamily="34" charset="0"/>
+            </a:endParaRPr>
           </a:p>
           <a:p>
             <a:pPr lvl="1"/>
@@ -6497,23 +6543,27 @@
           </a:p>
           <a:p>
             <a:pPr lvl="1"/>
-            <a:endParaRPr lang="en-US" altLang="zh-CN" b="0" i="0" u="none" strike="noStrike" dirty="0">
-              <a:solidFill>
-                <a:srgbClr val="212529"/>
-              </a:solidFill>
-              <a:effectLst/>
-              <a:latin typeface="Arial" panose="020B0604020202020204" pitchFamily="34" charset="0"/>
-            </a:endParaRPr>
+            <a:r>
+              <a:rPr lang="en-US" dirty="0">
+                <a:solidFill>
+                  <a:srgbClr val="212529"/>
+                </a:solidFill>
+                <a:latin typeface="Arial" panose="020B0604020202020204" pitchFamily="34" charset="0"/>
+              </a:rPr>
+              <a:t>T-statistic: -2.059574394684549</a:t>
+            </a:r>
           </a:p>
           <a:p>
             <a:pPr lvl="1"/>
-            <a:endParaRPr lang="en-US" altLang="zh-CN" b="0" i="0" u="none" strike="noStrike" dirty="0">
-              <a:solidFill>
-                <a:srgbClr val="212529"/>
-              </a:solidFill>
-              <a:effectLst/>
-              <a:latin typeface="Arial" panose="020B0604020202020204" pitchFamily="34" charset="0"/>
-            </a:endParaRPr>
+            <a:r>
+              <a:rPr lang="en-US" dirty="0">
+                <a:solidFill>
+                  <a:srgbClr val="212529"/>
+                </a:solidFill>
+                <a:latin typeface="Arial" panose="020B0604020202020204" pitchFamily="34" charset="0"/>
+              </a:rPr>
+              <a:t>P-value: 0.03949993360519476</a:t>
+            </a:r>
           </a:p>
           <a:p>
             <a:pPr lvl="1"/>
@@ -6543,6 +6593,22 @@
             <a:endParaRPr lang="en-US" dirty="0"/>
           </a:p>
           <a:p>
+            <a:r>
+              <a:rPr lang="en-US" dirty="0"/>
+              <a:t>        </a:t>
+            </a:r>
+            <a:r>
+              <a:rPr lang="en-US" dirty="0">
+                <a:solidFill>
+                  <a:srgbClr val="212529"/>
+                </a:solidFill>
+                <a:latin typeface="Arial" panose="020B0604020202020204" pitchFamily="34" charset="0"/>
+              </a:rPr>
+              <a:t>There exists significant evidence to reject the Null Hypothesis.</a:t>
+            </a:r>
+            <a:endParaRPr lang="en-US" dirty="0"/>
+          </a:p>
+          <a:p>
             <a:pPr marL="285750" indent="-285750">
               <a:buFont typeface="Arial" panose="020B0604020202020204" pitchFamily="34" charset="0"/>
               <a:buChar char="•"/>
@@ -6550,20 +6616,6 @@
             <a:endParaRPr lang="en-US" dirty="0"/>
           </a:p>
           <a:p>
-            <a:pPr marL="285750" indent="-285750">
-              <a:buFont typeface="Arial" panose="020B0604020202020204" pitchFamily="34" charset="0"/>
-              <a:buChar char="•"/>
-            </a:pPr>
-            <a:endParaRPr lang="en-US" dirty="0"/>
-          </a:p>
-          <a:p>
-            <a:pPr marL="285750" indent="-285750">
-              <a:buFont typeface="Arial" panose="020B0604020202020204" pitchFamily="34" charset="0"/>
-              <a:buChar char="•"/>
-            </a:pPr>
-            <a:endParaRPr lang="en-US" dirty="0"/>
-          </a:p>
-          <a:p>
             <a:r>
               <a:rPr lang="en-US" altLang="zh-CN" dirty="0"/>
               <a:t>Q4.c:</a:t>
@@ -6582,6 +6634,19 @@
               </a:rPr>
               <a:t>Does the testing result contradict your observation on the ”steer” feature in part 4.a? Why?</a:t>
             </a:r>
+          </a:p>
+          <a:p>
+            <a:r>
+              <a:rPr lang="en-US" dirty="0">
+                <a:solidFill>
+                  <a:srgbClr val="212529"/>
+                </a:solidFill>
+                <a:latin typeface="Arial" panose="020B0604020202020204" pitchFamily="34" charset="0"/>
+              </a:rPr>
+              <a:t>       This outcome contradicts our intuition as both the normal and abnormal distributions appear to have means centered very close to zero. Thus, we originally thought that there wouldn’t be a significant difference between their means.</a:t>
+            </a:r>
+          </a:p>
+          <a:p>
             <a:endParaRPr lang="en-US" dirty="0"/>
           </a:p>
         </p:txBody>
@@ -6669,7 +6734,7 @@
         <p:spPr>
           <a:xfrm>
             <a:off x="513729" y="1095875"/>
-            <a:ext cx="10720328" cy="4801314"/>
+            <a:ext cx="10720328" cy="5016758"/>
           </a:xfrm>
           <a:prstGeom prst="rect">
             <a:avLst/>
@@ -6683,19 +6748,19 @@
           <a:lstStyle/>
           <a:p>
             <a:r>
-              <a:rPr lang="en-US" dirty="0"/>
+              <a:rPr lang="en-US" sz="1600" dirty="0"/>
               <a:t>Q5</a:t>
             </a:r>
             <a:r>
-              <a:rPr lang="en-US" altLang="zh-CN" dirty="0"/>
+              <a:rPr lang="en-US" altLang="zh-CN" sz="1600" dirty="0"/>
               <a:t>:</a:t>
             </a:r>
             <a:r>
-              <a:rPr lang="zh-CN" altLang="en-US" dirty="0"/>
+              <a:rPr lang="zh-CN" altLang="en-US" sz="1600" dirty="0"/>
               <a:t> </a:t>
             </a:r>
             <a:r>
-              <a:rPr lang="en-US" altLang="zh-CN" dirty="0">
+              <a:rPr lang="en-US" altLang="zh-CN" sz="1600" dirty="0">
                 <a:solidFill>
                   <a:srgbClr val="212529"/>
                 </a:solidFill>
@@ -6704,7 +6769,7 @@
               <a:t>S</a:t>
             </a:r>
             <a:r>
-              <a:rPr lang="en-US" sz="1800" b="0" i="0" u="none" strike="noStrike" dirty="0">
+              <a:rPr lang="en-US" sz="1600" b="0" i="0" u="none" strike="noStrike" dirty="0">
                 <a:solidFill>
                   <a:srgbClr val="212529"/>
                 </a:solidFill>
@@ -6714,7 +6779,7 @@
               <a:t>ome of the</a:t>
             </a:r>
             <a:r>
-              <a:rPr lang="zh-CN" altLang="en-US" sz="1800" b="0" i="0" u="none" strike="noStrike" dirty="0">
+              <a:rPr lang="zh-CN" altLang="en-US" sz="1600" b="0" i="0" u="none" strike="noStrike" dirty="0">
                 <a:solidFill>
                   <a:srgbClr val="212529"/>
                 </a:solidFill>
@@ -6724,7 +6789,7 @@
               <a:t> </a:t>
             </a:r>
             <a:r>
-              <a:rPr lang="en-US" altLang="zh-CN" sz="1800" b="0" i="0" u="none" strike="noStrike" dirty="0">
+              <a:rPr lang="en-US" altLang="zh-CN" sz="1600" b="0" i="0" u="none" strike="noStrike" dirty="0">
                 <a:solidFill>
                   <a:srgbClr val="212529"/>
                 </a:solidFill>
@@ -6734,7 +6799,7 @@
               <a:t>features</a:t>
             </a:r>
             <a:r>
-              <a:rPr lang="en-US" sz="1800" b="0" i="0" u="none" strike="noStrike" dirty="0">
+              <a:rPr lang="en-US" sz="1600" b="0" i="0" u="none" strike="noStrike" dirty="0">
                 <a:solidFill>
                   <a:srgbClr val="212529"/>
                 </a:solidFill>
@@ -6743,28 +6808,14 @@
               </a:rPr>
               <a:t> are better indicators of abnormal AV behavior, can you identify them?</a:t>
             </a:r>
-            <a:endParaRPr lang="en-US" altLang="zh-CN" dirty="0"/>
           </a:p>
           <a:p>
             <a:pPr marL="342900" indent="-342900">
               <a:buFont typeface="+mj-lt"/>
               <a:buAutoNum type="alphaLcPeriod"/>
             </a:pPr>
-            <a:endParaRPr lang="en-US" sz="1800" b="0" i="0" u="none" strike="noStrike" dirty="0">
-              <a:solidFill>
-                <a:srgbClr val="212529"/>
-              </a:solidFill>
-              <a:effectLst/>
-              <a:latin typeface="Arial" panose="020B0604020202020204" pitchFamily="34" charset="0"/>
-            </a:endParaRPr>
-          </a:p>
-          <a:p>
-            <a:pPr marL="342900" indent="-342900">
-              <a:buFont typeface="+mj-lt"/>
-              <a:buAutoNum type="alphaLcPeriod"/>
-            </a:pPr>
-            <a:r>
-              <a:rPr lang="en-US" sz="1800" b="0" i="0" u="none" strike="noStrike" dirty="0">
+            <a:r>
+              <a:rPr lang="en-US" sz="1600" b="0" i="0" u="none" strike="noStrike" dirty="0">
                 <a:solidFill>
                   <a:srgbClr val="212529"/>
                 </a:solidFill>
@@ -6773,13 +6824,7 @@
               </a:rPr>
               <a:t>By looking at the distribution plots of the features in Task 2.4, explain your choice of indicators.</a:t>
             </a:r>
-          </a:p>
-          <a:p>
-            <a:pPr marL="342900" indent="-342900">
-              <a:buFont typeface="+mj-lt"/>
-              <a:buAutoNum type="alphaLcPeriod"/>
-            </a:pPr>
-            <a:endParaRPr lang="en-US" altLang="zh-CN" dirty="0">
+            <a:endParaRPr lang="en-US" altLang="zh-CN" sz="1600" dirty="0">
               <a:solidFill>
                 <a:srgbClr val="212529"/>
               </a:solidFill>
@@ -6787,11 +6832,53 @@
             </a:endParaRPr>
           </a:p>
           <a:p>
-            <a:pPr marL="342900" indent="-342900">
-              <a:buFont typeface="+mj-lt"/>
-              <a:buAutoNum type="alphaLcPeriod"/>
+            <a:pPr marL="285750" indent="-285750">
+              <a:buFont typeface="Arial" panose="020B0604020202020204" pitchFamily="34" charset="0"/>
+              <a:buChar char="•"/>
             </a:pPr>
-            <a:endParaRPr lang="en-US" altLang="zh-CN" dirty="0">
+            <a:r>
+              <a:rPr lang="en-US" sz="1600" dirty="0">
+                <a:solidFill>
+                  <a:srgbClr val="212529"/>
+                </a:solidFill>
+                <a:latin typeface="Arial" panose="020B0604020202020204" pitchFamily="34" charset="0"/>
+              </a:rPr>
+              <a:t>Steer - The normal runs had a higher density closer to zero and the abnormal had a higher variance and spread.</a:t>
+            </a:r>
+          </a:p>
+          <a:p>
+            <a:pPr marL="285750" indent="-285750">
+              <a:buFont typeface="Arial" panose="020B0604020202020204" pitchFamily="34" charset="0"/>
+              <a:buChar char="•"/>
+            </a:pPr>
+            <a:r>
+              <a:rPr lang="en-US" sz="1600" dirty="0">
+                <a:solidFill>
+                  <a:srgbClr val="212529"/>
+                </a:solidFill>
+                <a:latin typeface="Arial" panose="020B0604020202020204" pitchFamily="34" charset="0"/>
+              </a:rPr>
+              <a:t>X and </a:t>
+            </a:r>
+            <a:r>
+              <a:rPr lang="en-US" sz="1600" dirty="0" err="1">
+                <a:solidFill>
+                  <a:srgbClr val="212529"/>
+                </a:solidFill>
+                <a:latin typeface="Arial" panose="020B0604020202020204" pitchFamily="34" charset="0"/>
+              </a:rPr>
+              <a:t>Cvip</a:t>
+            </a:r>
+            <a:r>
+              <a:rPr lang="en-US" sz="1600" dirty="0">
+                <a:solidFill>
+                  <a:srgbClr val="212529"/>
+                </a:solidFill>
+                <a:latin typeface="Arial" panose="020B0604020202020204" pitchFamily="34" charset="0"/>
+              </a:rPr>
+              <a:t> - The abnormal plot shows two local maximums, one indicating a closer distance to the NPC actor and the other indicating a farther distance which was the response during the clear-night run where the EV changed lanes.</a:t>
+            </a:r>
+            <a:endParaRPr lang="en-US" altLang="zh-CN" sz="1600" dirty="0">
               <a:solidFill>
                 <a:srgbClr val="212529"/>
               </a:solidFill>
@@ -6799,7 +6886,11 @@
             </a:endParaRPr>
           </a:p>
           <a:p>
-            <a:endParaRPr lang="en-US" altLang="zh-CN" dirty="0">
+            <a:pPr marL="342900" indent="-342900">
+              <a:buFont typeface="+mj-lt"/>
+              <a:buAutoNum type="alphaLcPeriod"/>
+            </a:pPr>
+            <a:endParaRPr lang="en-US" altLang="zh-CN" sz="1600" dirty="0">
               <a:solidFill>
                 <a:srgbClr val="212529"/>
               </a:solidFill>
@@ -6809,9 +6900,120 @@
           <a:p>
             <a:pPr marL="342900" indent="-342900">
               <a:buFont typeface="+mj-lt"/>
-              <a:buAutoNum type="alphaLcPeriod"/>
+              <a:buAutoNum type="alphaLcPeriod" startAt="2"/>
             </a:pPr>
-            <a:endParaRPr lang="en-US" altLang="zh-CN" dirty="0">
+            <a:r>
+              <a:rPr lang="en-US" sz="1600" b="0" i="0" u="none" strike="noStrike" dirty="0">
+                <a:solidFill>
+                  <a:srgbClr val="212529"/>
+                </a:solidFill>
+                <a:effectLst/>
+                <a:latin typeface="Arial" panose="020B0604020202020204" pitchFamily="34" charset="0"/>
+              </a:rPr>
+              <a:t>For the fields you identified as good accident indicators above, are they related (Calculate the Pearson correlation coefficient between each pair of the indicators to justify your answer)? If so, how does that affect the predicting power of using one indicator versus using all of them? </a:t>
+            </a:r>
+            <a:endParaRPr lang="en-US" altLang="zh-CN" sz="1600" dirty="0"/>
+          </a:p>
+          <a:p>
+            <a:r>
+              <a:rPr lang="en-US" sz="1600" dirty="0">
+                <a:solidFill>
+                  <a:srgbClr val="212529"/>
+                </a:solidFill>
+                <a:latin typeface="Arial" panose="020B0604020202020204" pitchFamily="34" charset="0"/>
+              </a:rPr>
+              <a:t>Pearson Correlations</a:t>
+            </a:r>
+            <a:br>
+              <a:rPr lang="en-US" sz="1600" dirty="0">
+                <a:solidFill>
+                  <a:srgbClr val="212529"/>
+                </a:solidFill>
+                <a:latin typeface="Arial" panose="020B0604020202020204" pitchFamily="34" charset="0"/>
+              </a:rPr>
+            </a:br>
+            <a:r>
+              <a:rPr lang="en-US" sz="1600" dirty="0">
+                <a:solidFill>
+                  <a:srgbClr val="212529"/>
+                </a:solidFill>
+                <a:latin typeface="Arial" panose="020B0604020202020204" pitchFamily="34" charset="0"/>
+              </a:rPr>
+              <a:t>	Steering and x: 0.16049701319159093</a:t>
+            </a:r>
+            <a:br>
+              <a:rPr lang="en-US" sz="1600" dirty="0">
+                <a:solidFill>
+                  <a:srgbClr val="212529"/>
+                </a:solidFill>
+                <a:latin typeface="Arial" panose="020B0604020202020204" pitchFamily="34" charset="0"/>
+              </a:rPr>
+            </a:br>
+            <a:r>
+              <a:rPr lang="en-US" sz="1600" dirty="0">
+                <a:solidFill>
+                  <a:srgbClr val="212529"/>
+                </a:solidFill>
+                <a:latin typeface="Arial" panose="020B0604020202020204" pitchFamily="34" charset="0"/>
+              </a:rPr>
+              <a:t>	Steering and </a:t>
+            </a:r>
+            <a:r>
+              <a:rPr lang="en-US" sz="1600" dirty="0" err="1">
+                <a:solidFill>
+                  <a:srgbClr val="212529"/>
+                </a:solidFill>
+                <a:latin typeface="Arial" panose="020B0604020202020204" pitchFamily="34" charset="0"/>
+              </a:rPr>
+              <a:t>cvip</a:t>
+            </a:r>
+            <a:r>
+              <a:rPr lang="en-US" sz="1600" dirty="0">
+                <a:solidFill>
+                  <a:srgbClr val="212529"/>
+                </a:solidFill>
+                <a:latin typeface="Arial" panose="020B0604020202020204" pitchFamily="34" charset="0"/>
+              </a:rPr>
+              <a:t>: -0.06898881039039098</a:t>
+            </a:r>
+            <a:br>
+              <a:rPr lang="en-US" sz="1600" dirty="0">
+                <a:solidFill>
+                  <a:srgbClr val="212529"/>
+                </a:solidFill>
+                <a:latin typeface="Arial" panose="020B0604020202020204" pitchFamily="34" charset="0"/>
+              </a:rPr>
+            </a:br>
+            <a:r>
+              <a:rPr lang="en-US" sz="1600" dirty="0">
+                <a:solidFill>
+                  <a:srgbClr val="212529"/>
+                </a:solidFill>
+                <a:latin typeface="Arial" panose="020B0604020202020204" pitchFamily="34" charset="0"/>
+              </a:rPr>
+              <a:t>	</a:t>
+            </a:r>
+            <a:r>
+              <a:rPr lang="en-US" sz="1600" dirty="0" err="1">
+                <a:solidFill>
+                  <a:srgbClr val="212529"/>
+                </a:solidFill>
+                <a:latin typeface="Arial" panose="020B0604020202020204" pitchFamily="34" charset="0"/>
+              </a:rPr>
+              <a:t>cvip</a:t>
+            </a:r>
+            <a:r>
+              <a:rPr lang="en-US" sz="1600" dirty="0">
+                <a:solidFill>
+                  <a:srgbClr val="212529"/>
+                </a:solidFill>
+                <a:latin typeface="Arial" panose="020B0604020202020204" pitchFamily="34" charset="0"/>
+              </a:rPr>
+              <a:t> and x: -0.3015787487970796</a:t>
+            </a:r>
+          </a:p>
+          <a:p>
+            <a:endParaRPr lang="en-US" sz="1600" dirty="0">
               <a:solidFill>
                 <a:srgbClr val="212529"/>
               </a:solidFill>
@@ -6819,75 +7021,33 @@
             </a:endParaRPr>
           </a:p>
           <a:p>
-            <a:pPr marL="342900" indent="-342900">
-              <a:buFont typeface="+mj-lt"/>
-              <a:buAutoNum type="alphaLcPeriod"/>
-            </a:pPr>
-            <a:endParaRPr lang="en-US" altLang="zh-CN" dirty="0">
-              <a:solidFill>
-                <a:srgbClr val="212529"/>
-              </a:solidFill>
-              <a:latin typeface="Arial" panose="020B0604020202020204" pitchFamily="34" charset="0"/>
-            </a:endParaRPr>
-          </a:p>
-          <a:p>
-            <a:pPr marL="342900" indent="-342900">
-              <a:buFont typeface="+mj-lt"/>
-              <a:buAutoNum type="alphaLcPeriod" startAt="2"/>
-            </a:pPr>
-            <a:r>
-              <a:rPr lang="en-US" sz="1800" b="0" i="0" u="none" strike="noStrike" dirty="0">
+            <a:r>
+              <a:rPr lang="en-US" sz="1600" dirty="0">
                 <a:solidFill>
                   <a:srgbClr val="212529"/>
                 </a:solidFill>
-                <a:effectLst/>
                 <a:latin typeface="Arial" panose="020B0604020202020204" pitchFamily="34" charset="0"/>
               </a:rPr>
-              <a:t>For the fields you identified as good accident indicators above, are they related (Calculate the Pearson correlation coefficient between each pair of the indicators to justify your answer)? If so, how does that affect the predicting power of using one indicator versus using all of them? </a:t>
-            </a:r>
-            <a:endParaRPr lang="en-US" altLang="zh-CN" dirty="0"/>
-          </a:p>
-          <a:p>
-            <a:pPr marL="285750" indent="-285750">
-              <a:buFont typeface="Arial" panose="020B0604020202020204" pitchFamily="34" charset="0"/>
-              <a:buChar char="•"/>
-            </a:pPr>
-            <a:endParaRPr lang="en-US" altLang="zh-CN" dirty="0"/>
-          </a:p>
-          <a:p>
-            <a:pPr marL="285750" indent="-285750">
-              <a:buFont typeface="Arial" panose="020B0604020202020204" pitchFamily="34" charset="0"/>
-              <a:buChar char="•"/>
-            </a:pPr>
-            <a:endParaRPr lang="en-US" dirty="0"/>
-          </a:p>
-          <a:p>
-            <a:pPr marL="285750" indent="-285750">
-              <a:buFont typeface="Arial" panose="020B0604020202020204" pitchFamily="34" charset="0"/>
-              <a:buChar char="•"/>
-            </a:pPr>
-            <a:endParaRPr lang="en-US" dirty="0"/>
-          </a:p>
-          <a:p>
-            <a:pPr marL="285750" indent="-285750">
-              <a:buFont typeface="Arial" panose="020B0604020202020204" pitchFamily="34" charset="0"/>
-              <a:buChar char="•"/>
-            </a:pPr>
-            <a:endParaRPr lang="en-US" dirty="0"/>
-          </a:p>
-          <a:p>
-            <a:pPr marL="285750" indent="-285750">
-              <a:buFont typeface="Arial" panose="020B0604020202020204" pitchFamily="34" charset="0"/>
-              <a:buChar char="•"/>
-            </a:pPr>
-            <a:endParaRPr lang="en-US" dirty="0"/>
-          </a:p>
-          <a:p>
-            <a:pPr marL="285750" indent="-285750">
-              <a:buFont typeface="Arial" panose="020B0604020202020204" pitchFamily="34" charset="0"/>
-              <a:buChar char="•"/>
-            </a:pPr>
-            <a:endParaRPr lang="en-US" dirty="0"/>
+              <a:t>Although we don’t have enough collinearity with these features to have a major negative difference in the predicting power, in general we would want to avoid using features with higher correlation since it would take away from the predicting power by skewing the data. Of the above options, </a:t>
+            </a:r>
+            <a:r>
+              <a:rPr lang="en-US" sz="1600" dirty="0" err="1">
+                <a:solidFill>
+                  <a:srgbClr val="212529"/>
+                </a:solidFill>
+                <a:latin typeface="Arial" panose="020B0604020202020204" pitchFamily="34" charset="0"/>
+              </a:rPr>
+              <a:t>cvip</a:t>
+            </a:r>
+            <a:r>
+              <a:rPr lang="en-US" sz="1600" dirty="0">
+                <a:solidFill>
+                  <a:srgbClr val="212529"/>
+                </a:solidFill>
+                <a:latin typeface="Arial" panose="020B0604020202020204" pitchFamily="34" charset="0"/>
+              </a:rPr>
+              <a:t> and x are the most correlated and it may be redundant to include them both. That being said, since these features are relatively independent, using all of them would give us more predicting power than just using one of them.</a:t>
+            </a:r>
           </a:p>
         </p:txBody>
       </p:sp>
@@ -7026,38 +7186,26 @@
                 <a:effectLst/>
                 <a:latin typeface="Arial" panose="020B0604020202020204" pitchFamily="34" charset="0"/>
               </a:rPr>
-              <a:t> Task2.5 is indeed a good indicator of abnormal AV behavior, using the Kolmogorov–Smirnov two-sample test.</a:t>
-            </a:r>
-            <a:endParaRPr lang="en-US" altLang="zh-CN" dirty="0"/>
-          </a:p>
-          <a:p>
-            <a:pPr marL="342900" indent="-342900">
-              <a:buFont typeface="+mj-lt"/>
-              <a:buAutoNum type="alphaLcPeriod"/>
-            </a:pPr>
-            <a:r>
-              <a:rPr lang="en-US" sz="1800" b="0" i="0" u="none" strike="noStrike" dirty="0">
+              <a:t> Task2.5 is indeed a good </a:t>
+            </a:r>
+            <a:r>
+              <a:rPr lang="en-US" dirty="0">
                 <a:solidFill>
                   <a:srgbClr val="212529"/>
                 </a:solidFill>
-                <a:effectLst/>
                 <a:latin typeface="Arial" panose="020B0604020202020204" pitchFamily="34" charset="0"/>
               </a:rPr>
-              <a:t>Construct the null and the alternative hypothesis and state them below</a:t>
-            </a:r>
-          </a:p>
-          <a:p>
-            <a:pPr lvl="1"/>
-            <a:r>
-              <a:rPr lang="en-US" altLang="zh-CN" dirty="0">
+              <a:t>indicator of abnormal AV behavior, using the Kolmogorov–Smirnov two-sample test.</a:t>
+            </a:r>
+            <a:br>
+              <a:rPr lang="en-US" dirty="0">
                 <a:solidFill>
                   <a:srgbClr val="212529"/>
                 </a:solidFill>
                 <a:latin typeface="Arial" panose="020B0604020202020204" pitchFamily="34" charset="0"/>
               </a:rPr>
-              <a:t>H0:</a:t>
-            </a:r>
-            <a:endParaRPr lang="en-US" dirty="0">
+            </a:br>
+            <a:endParaRPr lang="en-US" altLang="zh-CN" dirty="0">
               <a:solidFill>
                 <a:srgbClr val="212529"/>
               </a:solidFill>
@@ -7065,6 +7213,47 @@
             </a:endParaRPr>
           </a:p>
           <a:p>
+            <a:pPr marL="342900" indent="-342900">
+              <a:buFont typeface="+mj-lt"/>
+              <a:buAutoNum type="alphaLcPeriod"/>
+            </a:pPr>
+            <a:r>
+              <a:rPr lang="en-US" dirty="0">
+                <a:solidFill>
+                  <a:srgbClr val="212529"/>
+                </a:solidFill>
+                <a:latin typeface="Arial" panose="020B0604020202020204" pitchFamily="34" charset="0"/>
+              </a:rPr>
+              <a:t>Construct </a:t>
+            </a:r>
+            <a:r>
+              <a:rPr lang="en-US" sz="1800" b="0" i="0" u="none" strike="noStrike" dirty="0">
+                <a:solidFill>
+                  <a:srgbClr val="212529"/>
+                </a:solidFill>
+                <a:effectLst/>
+                <a:latin typeface="Arial" panose="020B0604020202020204" pitchFamily="34" charset="0"/>
+              </a:rPr>
+              <a:t>the null and the alternative hypothesis and state them below</a:t>
+            </a:r>
+            <a:br>
+              <a:rPr lang="en-US" sz="1800" b="0" i="0" u="none" strike="noStrike" dirty="0">
+                <a:solidFill>
+                  <a:srgbClr val="212529"/>
+                </a:solidFill>
+                <a:effectLst/>
+                <a:latin typeface="Arial" panose="020B0604020202020204" pitchFamily="34" charset="0"/>
+              </a:rPr>
+            </a:br>
+            <a:endParaRPr lang="en-US" sz="1800" b="0" i="0" u="none" strike="noStrike" dirty="0">
+              <a:solidFill>
+                <a:srgbClr val="212529"/>
+              </a:solidFill>
+              <a:effectLst/>
+              <a:latin typeface="Arial" panose="020B0604020202020204" pitchFamily="34" charset="0"/>
+            </a:endParaRPr>
+          </a:p>
+          <a:p>
             <a:pPr lvl="1"/>
             <a:r>
               <a:rPr lang="en-US" altLang="zh-CN" dirty="0">
@@ -7073,11 +7262,121 @@
                 </a:solidFill>
                 <a:latin typeface="Arial" panose="020B0604020202020204" pitchFamily="34" charset="0"/>
               </a:rPr>
-              <a:t>H1:</a:t>
-            </a:r>
-          </a:p>
-          <a:p>
-            <a:pPr marL="800100" lvl="1" indent="-342900">
+              <a:t>H0:</a:t>
+            </a:r>
+            <a:r>
+              <a:rPr lang="en-US" b="0" dirty="0">
+                <a:solidFill>
+                  <a:srgbClr val="D4D4D4"/>
+                </a:solidFill>
+                <a:effectLst/>
+                <a:latin typeface="Consolas" panose="020B0609020204030204" pitchFamily="49" charset="0"/>
+              </a:rPr>
+              <a:t> </a:t>
+            </a:r>
+            <a:r>
+              <a:rPr lang="en-US" dirty="0">
+                <a:solidFill>
+                  <a:srgbClr val="212529"/>
+                </a:solidFill>
+                <a:latin typeface="Arial" panose="020B0604020202020204" pitchFamily="34" charset="0"/>
+              </a:rPr>
+              <a:t>There is no significant difference between the x variable distributions between the normal and abnormal runs. </a:t>
+            </a:r>
+          </a:p>
+          <a:p>
+            <a:pPr lvl="1"/>
+            <a:r>
+              <a:rPr lang="en-US" altLang="zh-CN" dirty="0">
+                <a:solidFill>
+                  <a:srgbClr val="212529"/>
+                </a:solidFill>
+                <a:latin typeface="Arial" panose="020B0604020202020204" pitchFamily="34" charset="0"/>
+              </a:rPr>
+              <a:t>H1: </a:t>
+            </a:r>
+            <a:r>
+              <a:rPr lang="en-US" dirty="0">
+                <a:solidFill>
+                  <a:srgbClr val="212529"/>
+                </a:solidFill>
+                <a:latin typeface="Arial" panose="020B0604020202020204" pitchFamily="34" charset="0"/>
+              </a:rPr>
+              <a:t>There is a significant difference between the x variable distributions between the normal and abnormal runs.</a:t>
+            </a:r>
+          </a:p>
+          <a:p>
+            <a:pPr lvl="1"/>
+            <a:endParaRPr lang="en-US" b="0" i="0" u="none" strike="noStrike" dirty="0">
+              <a:solidFill>
+                <a:srgbClr val="212529"/>
+              </a:solidFill>
+              <a:effectLst/>
+              <a:latin typeface="Arial" panose="020B0604020202020204" pitchFamily="34" charset="0"/>
+            </a:endParaRPr>
+          </a:p>
+          <a:p>
+            <a:pPr marL="342900" indent="-342900">
+              <a:buFont typeface="+mj-lt"/>
+              <a:buAutoNum type="alphaLcPeriod"/>
+            </a:pPr>
+            <a:r>
+              <a:rPr lang="en-US" sz="1800" b="0" i="0" u="none" strike="noStrike" dirty="0">
+                <a:solidFill>
+                  <a:srgbClr val="212529"/>
+                </a:solidFill>
+                <a:effectLst/>
+                <a:latin typeface="Arial" panose="020B0604020202020204" pitchFamily="34" charset="0"/>
+              </a:rPr>
+              <a:t>Perform the KS two-sample test and calculate its statistics.</a:t>
+            </a:r>
+            <a:br>
+              <a:rPr lang="en-US" sz="1800" b="0" i="0" u="none" strike="noStrike" dirty="0">
+                <a:solidFill>
+                  <a:srgbClr val="212529"/>
+                </a:solidFill>
+                <a:effectLst/>
+                <a:latin typeface="Arial" panose="020B0604020202020204" pitchFamily="34" charset="0"/>
+              </a:rPr>
+            </a:br>
+            <a:br>
+              <a:rPr lang="en-US" sz="1800" b="0" i="0" u="none" strike="noStrike" dirty="0">
+                <a:solidFill>
+                  <a:srgbClr val="212529"/>
+                </a:solidFill>
+                <a:effectLst/>
+                <a:latin typeface="Arial" panose="020B0604020202020204" pitchFamily="34" charset="0"/>
+              </a:rPr>
+            </a:br>
+            <a:r>
+              <a:rPr lang="en-US" dirty="0">
+                <a:solidFill>
+                  <a:srgbClr val="212529"/>
+                </a:solidFill>
+                <a:latin typeface="Arial" panose="020B0604020202020204" pitchFamily="34" charset="0"/>
+              </a:rPr>
+              <a:t>T-statistic: 0.5740786464011629</a:t>
+            </a:r>
+            <a:br>
+              <a:rPr lang="en-US" dirty="0">
+                <a:solidFill>
+                  <a:srgbClr val="212529"/>
+                </a:solidFill>
+                <a:latin typeface="Arial" panose="020B0604020202020204" pitchFamily="34" charset="0"/>
+              </a:rPr>
+            </a:br>
+            <a:r>
+              <a:rPr lang="en-US" dirty="0">
+                <a:solidFill>
+                  <a:srgbClr val="212529"/>
+                </a:solidFill>
+                <a:latin typeface="Arial" panose="020B0604020202020204" pitchFamily="34" charset="0"/>
+              </a:rPr>
+              <a:t>P-value: 2.6613101312928488*e^(-269)</a:t>
+            </a:r>
+          </a:p>
+          <a:p>
+            <a:pPr marL="342900" indent="-342900">
               <a:buFont typeface="+mj-lt"/>
               <a:buAutoNum type="alphaLcPeriod"/>
             </a:pPr>
@@ -7102,7 +7401,7 @@
                 <a:effectLst/>
                 <a:latin typeface="Arial" panose="020B0604020202020204" pitchFamily="34" charset="0"/>
               </a:rPr>
-              <a:t>Perform the KS two-sample test and calculate its statistics.</a:t>
+              <a:t>Assume a significance level of 0.05, what is your conclusion? </a:t>
             </a:r>
             <a:br>
               <a:rPr lang="en-US" sz="1800" b="0" i="0" u="none" strike="noStrike" dirty="0">
@@ -7113,110 +7412,16 @@
                 <a:latin typeface="Arial" panose="020B0604020202020204" pitchFamily="34" charset="0"/>
               </a:rPr>
             </a:br>
-            <a:endParaRPr lang="en-US" altLang="zh-CN" b="0" i="0" u="none" strike="noStrike" dirty="0">
-              <a:solidFill>
-                <a:srgbClr val="212529"/>
-              </a:solidFill>
-              <a:effectLst/>
-              <a:latin typeface="Arial" panose="020B0604020202020204" pitchFamily="34" charset="0"/>
-            </a:endParaRPr>
-          </a:p>
-          <a:p>
-            <a:pPr marL="800100" lvl="1" indent="-342900">
-              <a:buFont typeface="+mj-lt"/>
-              <a:buAutoNum type="alphaLcPeriod"/>
-            </a:pPr>
-            <a:endParaRPr lang="en-US" b="0" i="0" u="none" strike="noStrike" dirty="0">
-              <a:solidFill>
-                <a:srgbClr val="212529"/>
-              </a:solidFill>
-              <a:effectLst/>
-              <a:latin typeface="Arial" panose="020B0604020202020204" pitchFamily="34" charset="0"/>
-            </a:endParaRPr>
-          </a:p>
-          <a:p>
-            <a:pPr marL="342900" indent="-342900">
-              <a:buFont typeface="+mj-lt"/>
-              <a:buAutoNum type="alphaLcPeriod"/>
-            </a:pPr>
-            <a:r>
-              <a:rPr lang="en-US" sz="1800" b="0" i="0" u="none" strike="noStrike" dirty="0">
+            <a:r>
+              <a:rPr lang="en-US" dirty="0">
                 <a:solidFill>
                   <a:srgbClr val="212529"/>
                 </a:solidFill>
-                <a:effectLst/>
                 <a:latin typeface="Arial" panose="020B0604020202020204" pitchFamily="34" charset="0"/>
               </a:rPr>
-              <a:t>Assume a significance level of 0.05, what is your conclusion? </a:t>
+              <a:t>There exists significant evidence to reject the Null Hypothesis.</a:t>
             </a:r>
             <a:endParaRPr lang="en-US" dirty="0"/>
-          </a:p>
-          <a:p>
-            <a:pPr marL="342900" indent="-342900">
-              <a:buFont typeface="+mj-lt"/>
-              <a:buAutoNum type="alphaLcPeriod"/>
-            </a:pPr>
-            <a:endParaRPr lang="en-US" dirty="0"/>
-          </a:p>
-          <a:p>
-            <a:pPr marL="342900" indent="-342900">
-              <a:buFont typeface="+mj-lt"/>
-              <a:buAutoNum type="alphaLcPeriod"/>
-            </a:pPr>
-            <a:endParaRPr lang="en-US" dirty="0"/>
-          </a:p>
-          <a:p>
-            <a:pPr marL="342900" indent="-342900">
-              <a:buFont typeface="+mj-lt"/>
-              <a:buAutoNum type="alphaLcPeriod"/>
-            </a:pPr>
-            <a:r>
-              <a:rPr lang="en-US" sz="1800" b="0" i="0" u="none" strike="noStrike" dirty="0">
-                <a:solidFill>
-                  <a:srgbClr val="212529"/>
-                </a:solidFill>
-                <a:effectLst/>
-                <a:latin typeface="Arial" panose="020B0604020202020204" pitchFamily="34" charset="0"/>
-              </a:rPr>
-              <a:t>Repeat the same test on a feature that you did not select as an indicator of abnormal behavior in Task 2.5, what is your conclusion?</a:t>
-            </a:r>
-          </a:p>
-          <a:p>
-            <a:pPr marL="342900" indent="-342900">
-              <a:buFont typeface="+mj-lt"/>
-              <a:buAutoNum type="alphaLcPeriod"/>
-            </a:pPr>
-            <a:endParaRPr lang="en-US" dirty="0">
-              <a:solidFill>
-                <a:srgbClr val="212529"/>
-              </a:solidFill>
-              <a:latin typeface="Arial" panose="020B0604020202020204" pitchFamily="34" charset="0"/>
-            </a:endParaRPr>
-          </a:p>
-          <a:p>
-            <a:endParaRPr lang="en-US" sz="1800" b="0" i="0" u="none" strike="noStrike" dirty="0">
-              <a:solidFill>
-                <a:srgbClr val="212529"/>
-              </a:solidFill>
-              <a:effectLst/>
-              <a:latin typeface="Arial" panose="020B0604020202020204" pitchFamily="34" charset="0"/>
-            </a:endParaRPr>
-          </a:p>
-          <a:p>
-            <a:pPr marL="342900" indent="-342900">
-              <a:buFont typeface="+mj-lt"/>
-              <a:buAutoNum type="alphaLcPeriod" startAt="5"/>
-            </a:pPr>
-            <a:r>
-              <a:rPr lang="en-US" sz="1800" b="0" i="0" u="none" strike="noStrike" dirty="0">
-                <a:solidFill>
-                  <a:srgbClr val="212529"/>
-                </a:solidFill>
-                <a:effectLst/>
-                <a:latin typeface="Arial" panose="020B0604020202020204" pitchFamily="34" charset="0"/>
-              </a:rPr>
-              <a:t>What are the major differences between the KS test and the t-test?</a:t>
-            </a:r>
           </a:p>
           <a:p>
             <a:r>
@@ -7303,123 +7508,162 @@
       </p:grpSpPr>
       <p:sp>
         <p:nvSpPr>
-          <p:cNvPr id="5" name="TextBox 4">
-            <a:extLst>
-              <a:ext uri="{FF2B5EF4-FFF2-40B4-BE49-F238E27FC236}">
-                <a16:creationId xmlns:a16="http://schemas.microsoft.com/office/drawing/2014/main" id="{F0E19196-DC92-A64D-B6B9-C7B9A0673305}"/>
-              </a:ext>
-            </a:extLst>
-          </p:cNvPr>
-          <p:cNvSpPr txBox="1"/>
-          <p:nvPr/>
-        </p:nvSpPr>
-        <p:spPr>
-          <a:xfrm>
-            <a:off x="513729" y="1095875"/>
-            <a:ext cx="10720328" cy="2308324"/>
-          </a:xfrm>
-          <a:prstGeom prst="rect">
-            <a:avLst/>
-          </a:prstGeom>
-          <a:noFill/>
-        </p:spPr>
-        <p:txBody>
-          <a:bodyPr wrap="square" rtlCol="0">
-            <a:spAutoFit/>
+          <p:cNvPr id="3" name="Content Placeholder 2">
+            <a:extLst>
+              <a:ext uri="{FF2B5EF4-FFF2-40B4-BE49-F238E27FC236}">
+                <a16:creationId xmlns:a16="http://schemas.microsoft.com/office/drawing/2014/main" id="{11296798-FBE8-A93D-DB20-4ADCC2C0FDEB}"/>
+              </a:ext>
+            </a:extLst>
+          </p:cNvPr>
+          <p:cNvSpPr>
+            <a:spLocks noGrp="1"/>
+          </p:cNvSpPr>
+          <p:nvPr>
+            <p:ph idx="1"/>
+          </p:nvPr>
+        </p:nvSpPr>
+        <p:spPr>
+          <a:xfrm>
+            <a:off x="548951" y="538000"/>
+            <a:ext cx="10515600" cy="5685517"/>
+          </a:xfrm>
+        </p:spPr>
+        <p:txBody>
+          <a:bodyPr>
+            <a:normAutofit/>
           </a:bodyPr>
           <a:lstStyle/>
           <a:p>
-            <a:r>
-              <a:rPr lang="en-US" dirty="0"/>
-              <a:t>Q7: </a:t>
-            </a:r>
-            <a:r>
-              <a:rPr lang="en-US" altLang="zh-CN" dirty="0">
+            <a:pPr marL="0" indent="0">
+              <a:buNone/>
+            </a:pPr>
+            <a:r>
+              <a:rPr lang="en-US" sz="1800" dirty="0">
+                <a:solidFill>
+                  <a:srgbClr val="212529"/>
+                </a:solidFill>
                 <a:latin typeface="Arial" panose="020B0604020202020204" pitchFamily="34" charset="0"/>
-                <a:cs typeface="Arial" panose="020B0604020202020204" pitchFamily="34" charset="0"/>
-              </a:rPr>
-              <a:t>Keeping in mind that this experiment is executed over a period of time, what assumption did you make when using the KS two-sample test on the distributions in Task2.6? Are you able to come up with one situation where this assumption fails?</a:t>
-            </a:r>
-          </a:p>
-          <a:p>
-            <a:pPr marL="285750" indent="-285750">
-              <a:buFont typeface="Arial" panose="020B0604020202020204" pitchFamily="34" charset="0"/>
-              <a:buChar char="•"/>
+              </a:rPr>
+              <a:t>d. Repeat the same test on a feature that you did not select as an indicator of abnormal behavior in Task 2.5, what is your conclusion?</a:t>
+            </a:r>
+            <a:br>
+              <a:rPr lang="en-US" sz="1800" dirty="0">
+                <a:solidFill>
+                  <a:srgbClr val="212529"/>
+                </a:solidFill>
+                <a:latin typeface="Arial" panose="020B0604020202020204" pitchFamily="34" charset="0"/>
+              </a:rPr>
+            </a:br>
+            <a:endParaRPr lang="en-US" sz="1800" dirty="0">
+              <a:solidFill>
+                <a:srgbClr val="212529"/>
+              </a:solidFill>
+              <a:latin typeface="Arial" panose="020B0604020202020204" pitchFamily="34" charset="0"/>
+            </a:endParaRPr>
+          </a:p>
+          <a:p>
+            <a:r>
+              <a:rPr lang="en-US" sz="1800" dirty="0">
+                <a:solidFill>
+                  <a:srgbClr val="212529"/>
+                </a:solidFill>
+                <a:latin typeface="Arial" panose="020B0604020202020204" pitchFamily="34" charset="0"/>
+              </a:rPr>
+              <a:t>Using ‘brake’ values of abnormal runs vs normal runs</a:t>
+            </a:r>
+          </a:p>
+          <a:p>
+            <a:r>
+              <a:rPr lang="en-US" sz="1800" dirty="0">
+                <a:solidFill>
+                  <a:srgbClr val="212529"/>
+                </a:solidFill>
+                <a:latin typeface="Arial" panose="020B0604020202020204" pitchFamily="34" charset="0"/>
+              </a:rPr>
+              <a:t>H0: There is no significant difference between the brake variable distributions between the normal and abnormal runs.  </a:t>
+            </a:r>
+          </a:p>
+          <a:p>
+            <a:r>
+              <a:rPr lang="en-US" sz="1800" dirty="0">
+                <a:solidFill>
+                  <a:srgbClr val="212529"/>
+                </a:solidFill>
+                <a:latin typeface="Arial" panose="020B0604020202020204" pitchFamily="34" charset="0"/>
+              </a:rPr>
+              <a:t>H1: There is a significant difference between the brake variable distributions between the normal and abnormal runs.</a:t>
+            </a:r>
+          </a:p>
+          <a:p>
+            <a:pPr marL="0" indent="0">
+              <a:buNone/>
             </a:pPr>
-            <a:endParaRPr lang="en-US" dirty="0"/>
-          </a:p>
-          <a:p>
-            <a:pPr marL="285750" indent="-285750">
-              <a:buFont typeface="Arial" panose="020B0604020202020204" pitchFamily="34" charset="0"/>
-              <a:buChar char="•"/>
+            <a:br>
+              <a:rPr lang="en-US" sz="1800" dirty="0">
+                <a:solidFill>
+                  <a:srgbClr val="212529"/>
+                </a:solidFill>
+                <a:latin typeface="Arial" panose="020B0604020202020204" pitchFamily="34" charset="0"/>
+              </a:rPr>
+            </a:br>
+            <a:r>
+              <a:rPr lang="en-US" sz="1800" dirty="0">
+                <a:solidFill>
+                  <a:srgbClr val="212529"/>
+                </a:solidFill>
+                <a:latin typeface="Arial" panose="020B0604020202020204" pitchFamily="34" charset="0"/>
+              </a:rPr>
+              <a:t>     T-statistic: 0.03556296628829175</a:t>
+            </a:r>
+          </a:p>
+          <a:p>
+            <a:pPr marL="0" indent="0">
+              <a:buNone/>
             </a:pPr>
-            <a:endParaRPr lang="en-US" dirty="0"/>
-          </a:p>
-          <a:p>
-            <a:pPr marL="285750" indent="-285750">
-              <a:buFont typeface="Arial" panose="020B0604020202020204" pitchFamily="34" charset="0"/>
-              <a:buChar char="•"/>
+            <a:r>
+              <a:rPr lang="en-US" sz="1800" dirty="0">
+                <a:solidFill>
+                  <a:srgbClr val="212529"/>
+                </a:solidFill>
+                <a:latin typeface="Arial" panose="020B0604020202020204" pitchFamily="34" charset="0"/>
+              </a:rPr>
+              <a:t>     P-value: 0.210072458272195</a:t>
+            </a:r>
+          </a:p>
+          <a:p>
+            <a:pPr marL="0" indent="0">
+              <a:buNone/>
             </a:pPr>
-            <a:endParaRPr lang="en-US" dirty="0"/>
-          </a:p>
-          <a:p>
-            <a:pPr marL="285750" indent="-285750">
-              <a:buFont typeface="Arial" panose="020B0604020202020204" pitchFamily="34" charset="0"/>
-              <a:buChar char="•"/>
-            </a:pPr>
-            <a:endParaRPr lang="en-US" dirty="0"/>
-          </a:p>
-          <a:p>
-            <a:pPr marL="285750" indent="-285750">
-              <a:buFont typeface="Arial" panose="020B0604020202020204" pitchFamily="34" charset="0"/>
-              <a:buChar char="•"/>
-            </a:pPr>
-            <a:endParaRPr lang="en-US" dirty="0"/>
-          </a:p>
-        </p:txBody>
-      </p:sp>
-      <p:sp>
-        <p:nvSpPr>
-          <p:cNvPr id="2" name="Title 1">
-            <a:extLst>
-              <a:ext uri="{FF2B5EF4-FFF2-40B4-BE49-F238E27FC236}">
-                <a16:creationId xmlns:a16="http://schemas.microsoft.com/office/drawing/2014/main" id="{D734AE09-0795-4ADD-AD9A-B34B3AE4F422}"/>
-              </a:ext>
-            </a:extLst>
-          </p:cNvPr>
-          <p:cNvSpPr>
-            <a:spLocks noGrp="1"/>
-          </p:cNvSpPr>
-          <p:nvPr>
-            <p:ph type="title"/>
-          </p:nvPr>
-        </p:nvSpPr>
-        <p:spPr>
-          <a:xfrm>
-            <a:off x="838200" y="65130"/>
-            <a:ext cx="10515600" cy="1030745"/>
-          </a:xfrm>
-        </p:spPr>
-        <p:txBody>
-          <a:bodyPr/>
-          <a:lstStyle/>
-          <a:p>
-            <a:r>
-              <a:rPr lang="en-US" dirty="0"/>
-              <a:t>Task </a:t>
-            </a:r>
-            <a:r>
-              <a:rPr lang="en-US" altLang="zh-CN" dirty="0"/>
-              <a:t>2</a:t>
-            </a:r>
-            <a:endParaRPr lang="en-US" dirty="0"/>
+            <a:r>
+              <a:rPr lang="en-US" sz="1800" dirty="0">
+                <a:solidFill>
+                  <a:srgbClr val="212529"/>
+                </a:solidFill>
+                <a:latin typeface="Arial" panose="020B0604020202020204" pitchFamily="34" charset="0"/>
+              </a:rPr>
+              <a:t> Failed to reject Null Hypothesis.</a:t>
+            </a:r>
+            <a:endParaRPr lang="en-US" sz="1600" dirty="0">
+              <a:solidFill>
+                <a:srgbClr val="212529"/>
+              </a:solidFill>
+              <a:latin typeface="Arial" panose="020B0604020202020204" pitchFamily="34" charset="0"/>
+            </a:endParaRPr>
+          </a:p>
+          <a:p>
+            <a:endParaRPr lang="en-US" sz="1600" dirty="0">
+              <a:solidFill>
+                <a:srgbClr val="212529"/>
+              </a:solidFill>
+              <a:latin typeface="Arial" panose="020B0604020202020204" pitchFamily="34" charset="0"/>
+            </a:endParaRPr>
           </a:p>
         </p:txBody>
       </p:sp>
     </p:spTree>
     <p:extLst>
       <p:ext uri="{BB962C8B-B14F-4D97-AF65-F5344CB8AC3E}">
-        <p14:creationId xmlns:p14="http://schemas.microsoft.com/office/powerpoint/2010/main" val="3824790624"/>
+        <p14:creationId xmlns:p14="http://schemas.microsoft.com/office/powerpoint/2010/main" val="3865866528"/>
       </p:ext>
     </p:extLst>
   </p:cSld>
@@ -7448,6 +7692,229 @@
       </p:grpSpPr>
       <p:sp>
         <p:nvSpPr>
+          <p:cNvPr id="3" name="Content Placeholder 2">
+            <a:extLst>
+              <a:ext uri="{FF2B5EF4-FFF2-40B4-BE49-F238E27FC236}">
+                <a16:creationId xmlns:a16="http://schemas.microsoft.com/office/drawing/2014/main" id="{04FC6AB8-4156-93D8-0956-C313B783CDC1}"/>
+              </a:ext>
+            </a:extLst>
+          </p:cNvPr>
+          <p:cNvSpPr>
+            <a:spLocks noGrp="1"/>
+          </p:cNvSpPr>
+          <p:nvPr>
+            <p:ph idx="1"/>
+          </p:nvPr>
+        </p:nvSpPr>
+        <p:spPr>
+          <a:xfrm>
+            <a:off x="838200" y="606490"/>
+            <a:ext cx="10515600" cy="5570473"/>
+          </a:xfrm>
+        </p:spPr>
+        <p:txBody>
+          <a:bodyPr>
+            <a:normAutofit/>
+          </a:bodyPr>
+          <a:lstStyle/>
+          <a:p>
+            <a:pPr marL="0" indent="0">
+              <a:buNone/>
+            </a:pPr>
+            <a:r>
+              <a:rPr lang="en-US" sz="2000" dirty="0">
+                <a:solidFill>
+                  <a:srgbClr val="212529"/>
+                </a:solidFill>
+                <a:latin typeface="Arial" panose="020B0604020202020204" pitchFamily="34" charset="0"/>
+              </a:rPr>
+              <a:t>e. What are the major differences between the KS test and the t-test?</a:t>
+            </a:r>
+          </a:p>
+          <a:p>
+            <a:pPr marL="0" indent="0">
+              <a:buNone/>
+            </a:pPr>
+            <a:endParaRPr lang="en-US" sz="2000" dirty="0">
+              <a:solidFill>
+                <a:srgbClr val="212529"/>
+              </a:solidFill>
+              <a:latin typeface="Arial" panose="020B0604020202020204" pitchFamily="34" charset="0"/>
+            </a:endParaRPr>
+          </a:p>
+          <a:p>
+            <a:pPr marL="0" indent="0">
+              <a:buNone/>
+            </a:pPr>
+            <a:r>
+              <a:rPr lang="en-US" sz="2000" dirty="0">
+                <a:solidFill>
+                  <a:srgbClr val="212529"/>
+                </a:solidFill>
+                <a:latin typeface="Arial" panose="020B0604020202020204" pitchFamily="34" charset="0"/>
+              </a:rPr>
+              <a:t>Some of the major differences between the t-test and KS test include the following:</a:t>
+            </a:r>
+          </a:p>
+          <a:p>
+            <a:r>
+              <a:rPr lang="en-US" sz="2000" dirty="0">
+                <a:solidFill>
+                  <a:srgbClr val="212529"/>
+                </a:solidFill>
+                <a:latin typeface="Arial" panose="020B0604020202020204" pitchFamily="34" charset="0"/>
+              </a:rPr>
+              <a:t>T-test:</a:t>
+            </a:r>
+          </a:p>
+          <a:p>
+            <a:pPr lvl="1"/>
+            <a:r>
+              <a:rPr lang="en-US" sz="1600" dirty="0">
+                <a:solidFill>
+                  <a:srgbClr val="212529"/>
+                </a:solidFill>
+                <a:latin typeface="Arial" panose="020B0604020202020204" pitchFamily="34" charset="0"/>
+              </a:rPr>
+              <a:t>Measures the difference in means.</a:t>
+            </a:r>
+          </a:p>
+          <a:p>
+            <a:pPr lvl="1"/>
+            <a:r>
+              <a:rPr lang="en-US" sz="1600" dirty="0">
+                <a:solidFill>
+                  <a:srgbClr val="212529"/>
+                </a:solidFill>
+                <a:latin typeface="Arial" panose="020B0604020202020204" pitchFamily="34" charset="0"/>
+              </a:rPr>
+              <a:t>Used to determine whether two groups have different true means.</a:t>
+            </a:r>
+          </a:p>
+          <a:p>
+            <a:pPr lvl="1"/>
+            <a:r>
+              <a:rPr lang="en-US" sz="1600" dirty="0">
+                <a:solidFill>
+                  <a:srgbClr val="212529"/>
+                </a:solidFill>
+                <a:latin typeface="Arial" panose="020B0604020202020204" pitchFamily="34" charset="0"/>
+              </a:rPr>
+              <a:t>Statistic calculated with the pooled standard error and the number of observations in each group.</a:t>
+            </a:r>
+          </a:p>
+          <a:p>
+            <a:r>
+              <a:rPr lang="en-US" sz="2000" dirty="0">
+                <a:solidFill>
+                  <a:srgbClr val="212529"/>
+                </a:solidFill>
+                <a:latin typeface="Arial" panose="020B0604020202020204" pitchFamily="34" charset="0"/>
+              </a:rPr>
+              <a:t>KS-test:</a:t>
+            </a:r>
+          </a:p>
+          <a:p>
+            <a:pPr lvl="1"/>
+            <a:r>
+              <a:rPr lang="en-US" sz="1600" dirty="0">
+                <a:solidFill>
+                  <a:srgbClr val="212529"/>
+                </a:solidFill>
+                <a:latin typeface="Arial" panose="020B0604020202020204" pitchFamily="34" charset="0"/>
+              </a:rPr>
+              <a:t>    - Measures the maximum difference between CDFs of two samples.</a:t>
+            </a:r>
+          </a:p>
+          <a:p>
+            <a:pPr lvl="1"/>
+            <a:r>
+              <a:rPr lang="en-US" sz="1600" dirty="0">
+                <a:solidFill>
+                  <a:srgbClr val="212529"/>
+                </a:solidFill>
+                <a:latin typeface="Arial" panose="020B0604020202020204" pitchFamily="34" charset="0"/>
+              </a:rPr>
+              <a:t>    - Determines whether samples are drawn from different distributions.</a:t>
+            </a:r>
+          </a:p>
+          <a:p>
+            <a:pPr lvl="1"/>
+            <a:r>
+              <a:rPr lang="en-US" sz="1600" dirty="0">
+                <a:solidFill>
+                  <a:srgbClr val="212529"/>
+                </a:solidFill>
+                <a:latin typeface="Arial" panose="020B0604020202020204" pitchFamily="34" charset="0"/>
+              </a:rPr>
+              <a:t>    - Incorporates number of observations but NOT pooled standard error, or any measure of spread.</a:t>
+            </a:r>
+          </a:p>
+          <a:p>
+            <a:pPr marL="457200" lvl="1" indent="0">
+              <a:buNone/>
+            </a:pPr>
+            <a:endParaRPr lang="en-US" sz="1600" dirty="0">
+              <a:solidFill>
+                <a:srgbClr val="212529"/>
+              </a:solidFill>
+              <a:latin typeface="Arial" panose="020B0604020202020204" pitchFamily="34" charset="0"/>
+            </a:endParaRPr>
+          </a:p>
+          <a:p>
+            <a:pPr marL="0" indent="0">
+              <a:buNone/>
+            </a:pPr>
+            <a:r>
+              <a:rPr lang="en-US" sz="2000" dirty="0">
+                <a:solidFill>
+                  <a:srgbClr val="212529"/>
+                </a:solidFill>
+                <a:latin typeface="Arial" panose="020B0604020202020204" pitchFamily="34" charset="0"/>
+              </a:rPr>
+              <a:t>The t-test looks squarely at the means, though still taking account for variance (standard error) and group size. The KS-test looks at the distribution as a whole and any large discrepancies within. </a:t>
+            </a:r>
+          </a:p>
+          <a:p>
+            <a:pPr marL="0" indent="0">
+              <a:buNone/>
+            </a:pPr>
+            <a:endParaRPr lang="en-US" sz="2000" dirty="0"/>
+          </a:p>
+        </p:txBody>
+      </p:sp>
+    </p:spTree>
+    <p:extLst>
+      <p:ext uri="{BB962C8B-B14F-4D97-AF65-F5344CB8AC3E}">
+        <p14:creationId xmlns:p14="http://schemas.microsoft.com/office/powerpoint/2010/main" val="1154912966"/>
+      </p:ext>
+    </p:extLst>
+  </p:cSld>
+  <p:clrMapOvr>
+    <a:masterClrMapping/>
+  </p:clrMapOvr>
+</p:sld>
+</file>
+
+<file path=ppt/slides/slide26.xml><?xml version="1.0" encoding="utf-8"?>
+<p:sld xmlns:a="http://schemas.openxmlformats.org/drawingml/2006/main" xmlns:r="http://schemas.openxmlformats.org/officeDocument/2006/relationships" xmlns:p="http://schemas.openxmlformats.org/presentationml/2006/main">
+  <p:cSld>
+    <p:spTree>
+      <p:nvGrpSpPr>
+        <p:cNvPr id="1" name=""/>
+        <p:cNvGrpSpPr/>
+        <p:nvPr/>
+      </p:nvGrpSpPr>
+      <p:grpSpPr>
+        <a:xfrm>
+          <a:off x="0" y="0"/>
+          <a:ext cx="0" cy="0"/>
+          <a:chOff x="0" y="0"/>
+          <a:chExt cx="0" cy="0"/>
+        </a:xfrm>
+      </p:grpSpPr>
+      <p:sp>
+        <p:nvSpPr>
           <p:cNvPr id="5" name="TextBox 4">
             <a:extLst>
               <a:ext uri="{FF2B5EF4-FFF2-40B4-BE49-F238E27FC236}">
@@ -7461,7 +7928,171 @@
         <p:spPr>
           <a:xfrm>
             <a:off x="513729" y="1095875"/>
-            <a:ext cx="10720328" cy="2585323"/>
+            <a:ext cx="10720328" cy="4247317"/>
+          </a:xfrm>
+          <a:prstGeom prst="rect">
+            <a:avLst/>
+          </a:prstGeom>
+          <a:noFill/>
+        </p:spPr>
+        <p:txBody>
+          <a:bodyPr wrap="square" rtlCol="0">
+            <a:spAutoFit/>
+          </a:bodyPr>
+          <a:lstStyle/>
+          <a:p>
+            <a:r>
+              <a:rPr lang="en-US" dirty="0"/>
+              <a:t>Q7: </a:t>
+            </a:r>
+            <a:r>
+              <a:rPr lang="en-US" altLang="zh-CN" dirty="0">
+                <a:latin typeface="Arial" panose="020B0604020202020204" pitchFamily="34" charset="0"/>
+                <a:cs typeface="Arial" panose="020B0604020202020204" pitchFamily="34" charset="0"/>
+              </a:rPr>
+              <a:t>Keeping in mind that this experiment is executed over a period of time, what assumption did you make when using the KS two-sample test on the distributions in Task2.6? Are you able to come up with one situation where this assumption fails?</a:t>
+            </a:r>
+          </a:p>
+          <a:p>
+            <a:pPr marL="285750" indent="-285750">
+              <a:buFont typeface="Arial" panose="020B0604020202020204" pitchFamily="34" charset="0"/>
+              <a:buChar char="•"/>
+            </a:pPr>
+            <a:endParaRPr lang="en-US" dirty="0"/>
+          </a:p>
+          <a:p>
+            <a:r>
+              <a:rPr lang="en-US" dirty="0">
+                <a:latin typeface="Arial" panose="020B0604020202020204" pitchFamily="34" charset="0"/>
+                <a:cs typeface="Arial" panose="020B0604020202020204" pitchFamily="34" charset="0"/>
+              </a:rPr>
+              <a:t>The assumption we took was that all variables are independent to properly take the KS two-sample test on the distributions of task2.6. This means treating the data as if each moment in the simulation is independent of the previous one when actually it is not. This assumption fails when events happening in the simulation are dependent on the ones that happened before, for example, the braking part of the simulation. As the AV has a reaction time, as he sees the car beginning to cut him off (t-1) in timeframe t he reacts in a way that is dependent on t-1 and initiating breaking, making v, the throttle, braking, and </a:t>
+            </a:r>
+            <a:r>
+              <a:rPr lang="en-US" dirty="0" err="1">
+                <a:latin typeface="Arial" panose="020B0604020202020204" pitchFamily="34" charset="0"/>
+                <a:cs typeface="Arial" panose="020B0604020202020204" pitchFamily="34" charset="0"/>
+              </a:rPr>
+              <a:t>cvip</a:t>
+            </a:r>
+            <a:r>
+              <a:rPr lang="en-US" dirty="0">
+                <a:latin typeface="Arial" panose="020B0604020202020204" pitchFamily="34" charset="0"/>
+                <a:cs typeface="Arial" panose="020B0604020202020204" pitchFamily="34" charset="0"/>
+              </a:rPr>
+              <a:t> at time t also dependent at time t-1 therefore making this assumption fail.</a:t>
+            </a:r>
+          </a:p>
+          <a:p>
+            <a:endParaRPr lang="en-US" dirty="0"/>
+          </a:p>
+          <a:p>
+            <a:pPr marL="285750" indent="-285750">
+              <a:buFont typeface="Arial" panose="020B0604020202020204" pitchFamily="34" charset="0"/>
+              <a:buChar char="•"/>
+            </a:pPr>
+            <a:endParaRPr lang="en-US" dirty="0"/>
+          </a:p>
+          <a:p>
+            <a:pPr marL="285750" indent="-285750">
+              <a:buFont typeface="Arial" panose="020B0604020202020204" pitchFamily="34" charset="0"/>
+              <a:buChar char="•"/>
+            </a:pPr>
+            <a:endParaRPr lang="en-US" dirty="0"/>
+          </a:p>
+          <a:p>
+            <a:pPr marL="285750" indent="-285750">
+              <a:buFont typeface="Arial" panose="020B0604020202020204" pitchFamily="34" charset="0"/>
+              <a:buChar char="•"/>
+            </a:pPr>
+            <a:endParaRPr lang="en-US" dirty="0"/>
+          </a:p>
+        </p:txBody>
+      </p:sp>
+      <p:sp>
+        <p:nvSpPr>
+          <p:cNvPr id="2" name="Title 1">
+            <a:extLst>
+              <a:ext uri="{FF2B5EF4-FFF2-40B4-BE49-F238E27FC236}">
+                <a16:creationId xmlns:a16="http://schemas.microsoft.com/office/drawing/2014/main" id="{D734AE09-0795-4ADD-AD9A-B34B3AE4F422}"/>
+              </a:ext>
+            </a:extLst>
+          </p:cNvPr>
+          <p:cNvSpPr>
+            <a:spLocks noGrp="1"/>
+          </p:cNvSpPr>
+          <p:nvPr>
+            <p:ph type="title"/>
+          </p:nvPr>
+        </p:nvSpPr>
+        <p:spPr>
+          <a:xfrm>
+            <a:off x="838200" y="65130"/>
+            <a:ext cx="10515600" cy="1030745"/>
+          </a:xfrm>
+        </p:spPr>
+        <p:txBody>
+          <a:bodyPr/>
+          <a:lstStyle/>
+          <a:p>
+            <a:r>
+              <a:rPr lang="en-US" dirty="0"/>
+              <a:t>Task </a:t>
+            </a:r>
+            <a:r>
+              <a:rPr lang="en-US" altLang="zh-CN" dirty="0"/>
+              <a:t>2</a:t>
+            </a:r>
+            <a:endParaRPr lang="en-US" dirty="0"/>
+          </a:p>
+        </p:txBody>
+      </p:sp>
+    </p:spTree>
+    <p:extLst>
+      <p:ext uri="{BB962C8B-B14F-4D97-AF65-F5344CB8AC3E}">
+        <p14:creationId xmlns:p14="http://schemas.microsoft.com/office/powerpoint/2010/main" val="3824790624"/>
+      </p:ext>
+    </p:extLst>
+  </p:cSld>
+  <p:clrMapOvr>
+    <a:masterClrMapping/>
+  </p:clrMapOvr>
+</p:sld>
+</file>
+
+<file path=ppt/slides/slide27.xml><?xml version="1.0" encoding="utf-8"?>
+<p:sld xmlns:a="http://schemas.openxmlformats.org/drawingml/2006/main" xmlns:r="http://schemas.openxmlformats.org/officeDocument/2006/relationships" xmlns:p="http://schemas.openxmlformats.org/presentationml/2006/main">
+  <p:cSld>
+    <p:spTree>
+      <p:nvGrpSpPr>
+        <p:cNvPr id="1" name=""/>
+        <p:cNvGrpSpPr/>
+        <p:nvPr/>
+      </p:nvGrpSpPr>
+      <p:grpSpPr>
+        <a:xfrm>
+          <a:off x="0" y="0"/>
+          <a:ext cx="0" cy="0"/>
+          <a:chOff x="0" y="0"/>
+          <a:chExt cx="0" cy="0"/>
+        </a:xfrm>
+      </p:grpSpPr>
+      <p:sp>
+        <p:nvSpPr>
+          <p:cNvPr id="5" name="TextBox 4">
+            <a:extLst>
+              <a:ext uri="{FF2B5EF4-FFF2-40B4-BE49-F238E27FC236}">
+                <a16:creationId xmlns:a16="http://schemas.microsoft.com/office/drawing/2014/main" id="{F0E19196-DC92-A64D-B6B9-C7B9A0673305}"/>
+              </a:ext>
+            </a:extLst>
+          </p:cNvPr>
+          <p:cNvSpPr txBox="1"/>
+          <p:nvPr/>
+        </p:nvSpPr>
+        <p:spPr>
+          <a:xfrm>
+            <a:off x="513729" y="1095875"/>
+            <a:ext cx="10720328" cy="4247317"/>
           </a:xfrm>
           <a:prstGeom prst="rect">
             <a:avLst/>
@@ -7545,6 +8176,63 @@
               <a:t>), and apply the DTW distance on the two time-series dataset (using steering data of clear-noon as a reference): (1) steering data of clear-night and (2) steering data of clear-sunset. What can you say about the DTW distance for (1) and (2) with respect to the reference? </a:t>
             </a:r>
             <a:endParaRPr lang="en-US" dirty="0"/>
+          </a:p>
+          <a:p>
+            <a:pPr marL="285750" indent="-285750">
+              <a:buFont typeface="Arial" panose="020B0604020202020204" pitchFamily="34" charset="0"/>
+              <a:buChar char="•"/>
+            </a:pPr>
+            <a:r>
+              <a:rPr lang="en-US" dirty="0">
+                <a:solidFill>
+                  <a:srgbClr val="212529"/>
+                </a:solidFill>
+                <a:latin typeface="Arial" panose="020B0604020202020204" pitchFamily="34" charset="0"/>
+              </a:rPr>
+              <a:t>steering data of clear-night 1.17603264771516</a:t>
+            </a:r>
+          </a:p>
+          <a:p>
+            <a:pPr marL="285750" indent="-285750">
+              <a:buFont typeface="Arial" panose="020B0604020202020204" pitchFamily="34" charset="0"/>
+              <a:buChar char="•"/>
+            </a:pPr>
+            <a:r>
+              <a:rPr lang="en-US" dirty="0">
+                <a:solidFill>
+                  <a:srgbClr val="212529"/>
+                </a:solidFill>
+                <a:latin typeface="Arial" panose="020B0604020202020204" pitchFamily="34" charset="0"/>
+              </a:rPr>
+              <a:t>steering data of clear-sunset 0.050521340023401175</a:t>
+            </a:r>
+          </a:p>
+          <a:p>
+            <a:pPr marL="285750" indent="-285750">
+              <a:buFont typeface="Arial" panose="020B0604020202020204" pitchFamily="34" charset="0"/>
+              <a:buChar char="•"/>
+            </a:pPr>
+            <a:endParaRPr lang="en-US" dirty="0">
+              <a:solidFill>
+                <a:srgbClr val="212529"/>
+              </a:solidFill>
+              <a:latin typeface="Arial" panose="020B0604020202020204" pitchFamily="34" charset="0"/>
+            </a:endParaRPr>
+          </a:p>
+          <a:p>
+            <a:pPr marL="285750" indent="-285750">
+              <a:buFont typeface="Arial" panose="020B0604020202020204" pitchFamily="34" charset="0"/>
+              <a:buChar char="•"/>
+            </a:pPr>
+            <a:r>
+              <a:rPr lang="en-US" dirty="0">
+                <a:solidFill>
+                  <a:srgbClr val="212529"/>
+                </a:solidFill>
+                <a:latin typeface="Arial" panose="020B0604020202020204" pitchFamily="34" charset="0"/>
+              </a:rPr>
+              <a:t>There is a relatively low DTW distance between the steering data of clear-sunset and the reference compared to clear-night and reference. Thus, the steering data for clear-sunset is more similar to the reference (clear-noon) than clear-night.</a:t>
+            </a:r>
           </a:p>
           <a:p>
             <a:pPr marL="285750" indent="-285750">

</xml_diff>

<commit_message>
fixed typo, zipped final submission
</commit_message>
<xml_diff>
--- a/mp1_powerpoint.pptx
+++ b/mp1_powerpoint.pptx
@@ -286,7 +286,7 @@
           <a:p>
             <a:fld id="{3E188059-9AAA-48DC-89EE-5FBEEAFD7015}" type="datetimeFigureOut">
               <a:rPr lang="en-US" smtClean="0"/>
-              <a:t>9/23/2024</a:t>
+              <a:t>9/23/24</a:t>
             </a:fld>
             <a:endParaRPr lang="en-US"/>
           </a:p>
@@ -484,7 +484,7 @@
           <a:p>
             <a:fld id="{3E188059-9AAA-48DC-89EE-5FBEEAFD7015}" type="datetimeFigureOut">
               <a:rPr lang="en-US" smtClean="0"/>
-              <a:t>9/23/2024</a:t>
+              <a:t>9/23/24</a:t>
             </a:fld>
             <a:endParaRPr lang="en-US"/>
           </a:p>
@@ -692,7 +692,7 @@
           <a:p>
             <a:fld id="{3E188059-9AAA-48DC-89EE-5FBEEAFD7015}" type="datetimeFigureOut">
               <a:rPr lang="en-US" smtClean="0"/>
-              <a:t>9/23/2024</a:t>
+              <a:t>9/23/24</a:t>
             </a:fld>
             <a:endParaRPr lang="en-US"/>
           </a:p>
@@ -890,7 +890,7 @@
           <a:p>
             <a:fld id="{3E188059-9AAA-48DC-89EE-5FBEEAFD7015}" type="datetimeFigureOut">
               <a:rPr lang="en-US" smtClean="0"/>
-              <a:t>9/23/2024</a:t>
+              <a:t>9/23/24</a:t>
             </a:fld>
             <a:endParaRPr lang="en-US"/>
           </a:p>
@@ -1165,7 +1165,7 @@
           <a:p>
             <a:fld id="{3E188059-9AAA-48DC-89EE-5FBEEAFD7015}" type="datetimeFigureOut">
               <a:rPr lang="en-US" smtClean="0"/>
-              <a:t>9/23/2024</a:t>
+              <a:t>9/23/24</a:t>
             </a:fld>
             <a:endParaRPr lang="en-US"/>
           </a:p>
@@ -1430,7 +1430,7 @@
           <a:p>
             <a:fld id="{3E188059-9AAA-48DC-89EE-5FBEEAFD7015}" type="datetimeFigureOut">
               <a:rPr lang="en-US" smtClean="0"/>
-              <a:t>9/23/2024</a:t>
+              <a:t>9/23/24</a:t>
             </a:fld>
             <a:endParaRPr lang="en-US"/>
           </a:p>
@@ -1842,7 +1842,7 @@
           <a:p>
             <a:fld id="{3E188059-9AAA-48DC-89EE-5FBEEAFD7015}" type="datetimeFigureOut">
               <a:rPr lang="en-US" smtClean="0"/>
-              <a:t>9/23/2024</a:t>
+              <a:t>9/23/24</a:t>
             </a:fld>
             <a:endParaRPr lang="en-US"/>
           </a:p>
@@ -1983,7 +1983,7 @@
           <a:p>
             <a:fld id="{3E188059-9AAA-48DC-89EE-5FBEEAFD7015}" type="datetimeFigureOut">
               <a:rPr lang="en-US" smtClean="0"/>
-              <a:t>9/23/2024</a:t>
+              <a:t>9/23/24</a:t>
             </a:fld>
             <a:endParaRPr lang="en-US"/>
           </a:p>
@@ -2096,7 +2096,7 @@
           <a:p>
             <a:fld id="{3E188059-9AAA-48DC-89EE-5FBEEAFD7015}" type="datetimeFigureOut">
               <a:rPr lang="en-US" smtClean="0"/>
-              <a:t>9/23/2024</a:t>
+              <a:t>9/23/24</a:t>
             </a:fld>
             <a:endParaRPr lang="en-US"/>
           </a:p>
@@ -2407,7 +2407,7 @@
           <a:p>
             <a:fld id="{3E188059-9AAA-48DC-89EE-5FBEEAFD7015}" type="datetimeFigureOut">
               <a:rPr lang="en-US" smtClean="0"/>
-              <a:t>9/23/2024</a:t>
+              <a:t>9/23/24</a:t>
             </a:fld>
             <a:endParaRPr lang="en-US"/>
           </a:p>
@@ -2695,7 +2695,7 @@
           <a:p>
             <a:fld id="{3E188059-9AAA-48DC-89EE-5FBEEAFD7015}" type="datetimeFigureOut">
               <a:rPr lang="en-US" smtClean="0"/>
-              <a:t>9/23/2024</a:t>
+              <a:t>9/23/24</a:t>
             </a:fld>
             <a:endParaRPr lang="en-US"/>
           </a:p>
@@ -2936,7 +2936,7 @@
           <a:p>
             <a:fld id="{3E188059-9AAA-48DC-89EE-5FBEEAFD7015}" type="datetimeFigureOut">
               <a:rPr lang="en-US" smtClean="0"/>
-              <a:t>9/23/2024</a:t>
+              <a:t>9/23/24</a:t>
             </a:fld>
             <a:endParaRPr lang="en-US"/>
           </a:p>
@@ -7163,7 +7163,7 @@
                   <a:srgbClr val="212529"/>
                 </a:solidFill>
               </a:rPr>
-              <a:t>X and </a:t>
+              <a:t>x and </a:t>
             </a:r>
             <a:r>
               <a:rPr lang="en-US" sz="1600" dirty="0" err="1">
@@ -7171,7 +7171,7 @@
                   <a:srgbClr val="212529"/>
                 </a:solidFill>
               </a:rPr>
-              <a:t>Cvip</a:t>
+              <a:t>cvip</a:t>
             </a:r>
             <a:r>
               <a:rPr lang="en-US" sz="1600" dirty="0">
@@ -7635,7 +7635,7 @@
                   <a:srgbClr val="212529"/>
                 </a:solidFill>
               </a:rPr>
-              <a:t>P-value: 2.6613101312928488*e^(-269)</a:t>
+              <a:t>P-value: 2.6613101312928488e-269</a:t>
             </a:r>
           </a:p>
           <a:p>
@@ -8199,19 +8199,7 @@
               <a:rPr lang="en-US" dirty="0">
                 <a:cs typeface="Arial" panose="020B0604020202020204" pitchFamily="34" charset="0"/>
               </a:rPr>
-              <a:t>The assumption we took was that all variables are independent to properly take the KS two-sample test on the distributions of task 2.6. This means treating the data as if each moment in the simulation is independent of the previous one when </a:t>
-            </a:r>
-            <a:r>
-              <a:rPr lang="en-US" dirty="0" err="1">
-                <a:cs typeface="Arial" panose="020B0604020202020204" pitchFamily="34" charset="0"/>
-              </a:rPr>
-              <a:t>actualy</a:t>
-            </a:r>
-            <a:r>
-              <a:rPr lang="en-US" dirty="0">
-                <a:cs typeface="Arial" panose="020B0604020202020204" pitchFamily="34" charset="0"/>
-              </a:rPr>
-              <a:t> it is not. This assumption fails when events happening in the simulation are dependent on the ones that happened before, for example, the braking part of the simulation. As the AV has a reaction time, as he sees the car beginning to cut him off (t-1) in timeframe t he reacts in a way that is dependent on t-1 and initiating breaking, making v, the throttle, braking, and </a:t>
+              <a:t>The assumption we took was that all variables are independent to properly take the KS two-sample test on the distributions of task 2.6. This means treating the data as if each moment in the simulation is independent of the previous one when actually it is not. This assumption fails when events happening in the simulation are dependent on the ones that happened before, for example, the braking part of the simulation. As the AV has a reaction time, as he sees the car beginning to cut him off (t-1) in timeframe t he reacts in a way that is dependent on t-1 and initiating breaking, making v, the throttle, braking, and </a:t>
             </a:r>
             <a:r>
               <a:rPr lang="en-US" dirty="0" err="1">

</xml_diff>